<commit_message>
ofc:at module 4: The session and message...
</commit_message>
<xml_diff>
--- a/flaskTut.pptx
+++ b/flaskTut.pptx
@@ -14,6 +14,12 @@
     <p:sldId id="261" r:id="rId8"/>
     <p:sldId id="263" r:id="rId9"/>
     <p:sldId id="264" r:id="rId10"/>
+    <p:sldId id="265" r:id="rId11"/>
+    <p:sldId id="266" r:id="rId12"/>
+    <p:sldId id="268" r:id="rId13"/>
+    <p:sldId id="267" r:id="rId14"/>
+    <p:sldId id="269" r:id="rId15"/>
+    <p:sldId id="270" r:id="rId16"/>
   </p:sldIdLst>
   <p:sldSz cx="12192000" cy="6858000"/>
   <p:notesSz cx="6858000" cy="9144000"/>
@@ -251,7 +257,7 @@
           <a:p>
             <a:fld id="{C034A774-CEB8-4E41-B8C9-0CB641BF3E40}" type="datetimeFigureOut">
               <a:rPr lang="en-US" smtClean="0"/>
-              <a:t>11/12/2019</a:t>
+              <a:t>11/15/2019</a:t>
             </a:fld>
             <a:endParaRPr lang="en-US"/>
           </a:p>
@@ -421,7 +427,7 @@
           <a:p>
             <a:fld id="{C034A774-CEB8-4E41-B8C9-0CB641BF3E40}" type="datetimeFigureOut">
               <a:rPr lang="en-US" smtClean="0"/>
-              <a:t>11/12/2019</a:t>
+              <a:t>11/15/2019</a:t>
             </a:fld>
             <a:endParaRPr lang="en-US"/>
           </a:p>
@@ -601,7 +607,7 @@
           <a:p>
             <a:fld id="{C034A774-CEB8-4E41-B8C9-0CB641BF3E40}" type="datetimeFigureOut">
               <a:rPr lang="en-US" smtClean="0"/>
-              <a:t>11/12/2019</a:t>
+              <a:t>11/15/2019</a:t>
             </a:fld>
             <a:endParaRPr lang="en-US"/>
           </a:p>
@@ -771,7 +777,7 @@
           <a:p>
             <a:fld id="{C034A774-CEB8-4E41-B8C9-0CB641BF3E40}" type="datetimeFigureOut">
               <a:rPr lang="en-US" smtClean="0"/>
-              <a:t>11/12/2019</a:t>
+              <a:t>11/15/2019</a:t>
             </a:fld>
             <a:endParaRPr lang="en-US"/>
           </a:p>
@@ -1017,7 +1023,7 @@
           <a:p>
             <a:fld id="{C034A774-CEB8-4E41-B8C9-0CB641BF3E40}" type="datetimeFigureOut">
               <a:rPr lang="en-US" smtClean="0"/>
-              <a:t>11/12/2019</a:t>
+              <a:t>11/15/2019</a:t>
             </a:fld>
             <a:endParaRPr lang="en-US"/>
           </a:p>
@@ -1249,7 +1255,7 @@
           <a:p>
             <a:fld id="{C034A774-CEB8-4E41-B8C9-0CB641BF3E40}" type="datetimeFigureOut">
               <a:rPr lang="en-US" smtClean="0"/>
-              <a:t>11/12/2019</a:t>
+              <a:t>11/15/2019</a:t>
             </a:fld>
             <a:endParaRPr lang="en-US"/>
           </a:p>
@@ -1616,7 +1622,7 @@
           <a:p>
             <a:fld id="{C034A774-CEB8-4E41-B8C9-0CB641BF3E40}" type="datetimeFigureOut">
               <a:rPr lang="en-US" smtClean="0"/>
-              <a:t>11/12/2019</a:t>
+              <a:t>11/15/2019</a:t>
             </a:fld>
             <a:endParaRPr lang="en-US"/>
           </a:p>
@@ -1734,7 +1740,7 @@
           <a:p>
             <a:fld id="{C034A774-CEB8-4E41-B8C9-0CB641BF3E40}" type="datetimeFigureOut">
               <a:rPr lang="en-US" smtClean="0"/>
-              <a:t>11/12/2019</a:t>
+              <a:t>11/15/2019</a:t>
             </a:fld>
             <a:endParaRPr lang="en-US"/>
           </a:p>
@@ -1829,7 +1835,7 @@
           <a:p>
             <a:fld id="{C034A774-CEB8-4E41-B8C9-0CB641BF3E40}" type="datetimeFigureOut">
               <a:rPr lang="en-US" smtClean="0"/>
-              <a:t>11/12/2019</a:t>
+              <a:t>11/15/2019</a:t>
             </a:fld>
             <a:endParaRPr lang="en-US"/>
           </a:p>
@@ -2106,7 +2112,7 @@
           <a:p>
             <a:fld id="{C034A774-CEB8-4E41-B8C9-0CB641BF3E40}" type="datetimeFigureOut">
               <a:rPr lang="en-US" smtClean="0"/>
-              <a:t>11/12/2019</a:t>
+              <a:t>11/15/2019</a:t>
             </a:fld>
             <a:endParaRPr lang="en-US"/>
           </a:p>
@@ -2359,7 +2365,7 @@
           <a:p>
             <a:fld id="{C034A774-CEB8-4E41-B8C9-0CB641BF3E40}" type="datetimeFigureOut">
               <a:rPr lang="en-US" smtClean="0"/>
-              <a:t>11/12/2019</a:t>
+              <a:t>11/15/2019</a:t>
             </a:fld>
             <a:endParaRPr lang="en-US"/>
           </a:p>
@@ -2572,7 +2578,7 @@
           <a:p>
             <a:fld id="{C034A774-CEB8-4E41-B8C9-0CB641BF3E40}" type="datetimeFigureOut">
               <a:rPr lang="en-US" smtClean="0"/>
-              <a:t>11/12/2019</a:t>
+              <a:t>11/15/2019</a:t>
             </a:fld>
             <a:endParaRPr lang="en-US"/>
           </a:p>
@@ -3032,6 +3038,887 @@
 </p:sld>
 </file>
 
+<file path=ppt/slides/slide10.xml><?xml version="1.0" encoding="utf-8"?>
+<p:sld xmlns:a="http://schemas.openxmlformats.org/drawingml/2006/main" xmlns:r="http://schemas.openxmlformats.org/officeDocument/2006/relationships" xmlns:p="http://schemas.openxmlformats.org/presentationml/2006/main">
+  <p:cSld>
+    <p:spTree>
+      <p:nvGrpSpPr>
+        <p:cNvPr id="1" name=""/>
+        <p:cNvGrpSpPr/>
+        <p:nvPr/>
+      </p:nvGrpSpPr>
+      <p:grpSpPr>
+        <a:xfrm>
+          <a:off x="0" y="0"/>
+          <a:ext cx="0" cy="0"/>
+          <a:chOff x="0" y="0"/>
+          <a:chExt cx="0" cy="0"/>
+        </a:xfrm>
+      </p:grpSpPr>
+      <p:pic>
+        <p:nvPicPr>
+          <p:cNvPr id="2" name="Picture 1"/>
+          <p:cNvPicPr>
+            <a:picLocks noChangeAspect="1"/>
+          </p:cNvPicPr>
+          <p:nvPr/>
+        </p:nvPicPr>
+        <p:blipFill>
+          <a:blip r:embed="rId2"/>
+          <a:stretch>
+            <a:fillRect/>
+          </a:stretch>
+        </p:blipFill>
+        <p:spPr>
+          <a:xfrm>
+            <a:off x="665828" y="1375820"/>
+            <a:ext cx="8718035" cy="3078747"/>
+          </a:xfrm>
+          <a:prstGeom prst="rect">
+            <a:avLst/>
+          </a:prstGeom>
+        </p:spPr>
+      </p:pic>
+      <p:sp>
+        <p:nvSpPr>
+          <p:cNvPr id="3" name="Title 2"/>
+          <p:cNvSpPr>
+            <a:spLocks noGrp="1"/>
+          </p:cNvSpPr>
+          <p:nvPr>
+            <p:ph type="title"/>
+          </p:nvPr>
+        </p:nvSpPr>
+        <p:spPr/>
+        <p:txBody>
+          <a:bodyPr/>
+          <a:lstStyle/>
+          <a:p>
+            <a:r>
+              <a:rPr lang="en-US" dirty="0" smtClean="0"/>
+              <a:t>Template inheritance</a:t>
+            </a:r>
+            <a:endParaRPr lang="en-US" dirty="0"/>
+          </a:p>
+        </p:txBody>
+      </p:sp>
+      <p:sp>
+        <p:nvSpPr>
+          <p:cNvPr id="4" name="Line Callout 1 3"/>
+          <p:cNvSpPr/>
+          <p:nvPr/>
+        </p:nvSpPr>
+        <p:spPr>
+          <a:xfrm>
+            <a:off x="1036318" y="4737462"/>
+            <a:ext cx="4423955" cy="1929081"/>
+          </a:xfrm>
+          <a:prstGeom prst="borderCallout1">
+            <a:avLst>
+              <a:gd name="adj1" fmla="val 1375"/>
+              <a:gd name="adj2" fmla="val 37139"/>
+              <a:gd name="adj3" fmla="val -97021"/>
+              <a:gd name="adj4" fmla="val 49265"/>
+            </a:avLst>
+          </a:prstGeom>
+        </p:spPr>
+        <p:style>
+          <a:lnRef idx="2">
+            <a:schemeClr val="accent4">
+              <a:shade val="50000"/>
+            </a:schemeClr>
+          </a:lnRef>
+          <a:fillRef idx="1">
+            <a:schemeClr val="accent4"/>
+          </a:fillRef>
+          <a:effectRef idx="0">
+            <a:schemeClr val="accent4"/>
+          </a:effectRef>
+          <a:fontRef idx="minor">
+            <a:schemeClr val="lt1"/>
+          </a:fontRef>
+        </p:style>
+        <p:txBody>
+          <a:bodyPr rtlCol="0" anchor="ctr"/>
+          <a:lstStyle/>
+          <a:p>
+            <a:r>
+              <a:rPr lang="en-US" dirty="0" smtClean="0"/>
+              <a:t>All other logic like for loops and if-else statements go in </a:t>
+            </a:r>
+            <a:r>
+              <a:rPr lang="en-US" i="1" dirty="0" smtClean="0"/>
+              <a:t>curly braces + % sign </a:t>
+            </a:r>
+            <a:r>
+              <a:rPr lang="en-US" dirty="0" smtClean="0"/>
+              <a:t> = block. </a:t>
+            </a:r>
+          </a:p>
+          <a:p>
+            <a:r>
+              <a:rPr lang="en-US" dirty="0" smtClean="0"/>
+              <a:t>	Syntax: </a:t>
+            </a:r>
+          </a:p>
+          <a:p>
+            <a:r>
+              <a:rPr lang="en-US" dirty="0" smtClean="0"/>
+              <a:t>{% block </a:t>
+            </a:r>
+            <a:r>
+              <a:rPr lang="en-US" i="1" dirty="0" err="1" smtClean="0"/>
+              <a:t>nameOfBlock</a:t>
+            </a:r>
+            <a:r>
+              <a:rPr lang="en-US" dirty="0" smtClean="0"/>
+              <a:t> %}{% </a:t>
+            </a:r>
+            <a:r>
+              <a:rPr lang="en-US" dirty="0" err="1" smtClean="0"/>
+              <a:t>endblock</a:t>
+            </a:r>
+            <a:r>
+              <a:rPr lang="en-US" dirty="0" smtClean="0"/>
+              <a:t> %}</a:t>
+            </a:r>
+            <a:endParaRPr lang="en-US" dirty="0"/>
+          </a:p>
+        </p:txBody>
+      </p:sp>
+    </p:spTree>
+    <p:extLst>
+      <p:ext uri="{BB962C8B-B14F-4D97-AF65-F5344CB8AC3E}">
+        <p14:creationId xmlns:p14="http://schemas.microsoft.com/office/powerpoint/2010/main" val="2144018121"/>
+      </p:ext>
+    </p:extLst>
+  </p:cSld>
+  <p:clrMapOvr>
+    <a:masterClrMapping/>
+  </p:clrMapOvr>
+  <p:timing>
+    <p:tnLst>
+      <p:par>
+        <p:cTn id="1" dur="indefinite" restart="never" nodeType="tmRoot"/>
+      </p:par>
+    </p:tnLst>
+  </p:timing>
+</p:sld>
+</file>
+
+<file path=ppt/slides/slide11.xml><?xml version="1.0" encoding="utf-8"?>
+<p:sld xmlns:a="http://schemas.openxmlformats.org/drawingml/2006/main" xmlns:r="http://schemas.openxmlformats.org/officeDocument/2006/relationships" xmlns:p="http://schemas.openxmlformats.org/presentationml/2006/main">
+  <p:cSld>
+    <p:spTree>
+      <p:nvGrpSpPr>
+        <p:cNvPr id="1" name=""/>
+        <p:cNvGrpSpPr/>
+        <p:nvPr/>
+      </p:nvGrpSpPr>
+      <p:grpSpPr>
+        <a:xfrm>
+          <a:off x="0" y="0"/>
+          <a:ext cx="0" cy="0"/>
+          <a:chOff x="0" y="0"/>
+          <a:chExt cx="0" cy="0"/>
+        </a:xfrm>
+      </p:grpSpPr>
+      <p:pic>
+        <p:nvPicPr>
+          <p:cNvPr id="3" name="Picture 2"/>
+          <p:cNvPicPr>
+            <a:picLocks noChangeAspect="1"/>
+          </p:cNvPicPr>
+          <p:nvPr/>
+        </p:nvPicPr>
+        <p:blipFill>
+          <a:blip r:embed="rId2"/>
+          <a:stretch>
+            <a:fillRect/>
+          </a:stretch>
+        </p:blipFill>
+        <p:spPr>
+          <a:xfrm>
+            <a:off x="394232" y="418897"/>
+            <a:ext cx="7922453" cy="4679085"/>
+          </a:xfrm>
+          <a:prstGeom prst="rect">
+            <a:avLst/>
+          </a:prstGeom>
+        </p:spPr>
+      </p:pic>
+      <p:sp>
+        <p:nvSpPr>
+          <p:cNvPr id="4" name="Line Callout 1 3"/>
+          <p:cNvSpPr/>
+          <p:nvPr/>
+        </p:nvSpPr>
+        <p:spPr>
+          <a:xfrm>
+            <a:off x="4355458" y="4196645"/>
+            <a:ext cx="6914606" cy="2551611"/>
+          </a:xfrm>
+          <a:prstGeom prst="borderCallout1">
+            <a:avLst>
+              <a:gd name="adj1" fmla="val 18750"/>
+              <a:gd name="adj2" fmla="val -8333"/>
+              <a:gd name="adj3" fmla="val -122995"/>
+              <a:gd name="adj4" fmla="val -35436"/>
+            </a:avLst>
+          </a:prstGeom>
+        </p:spPr>
+        <p:style>
+          <a:lnRef idx="2">
+            <a:schemeClr val="accent4">
+              <a:shade val="50000"/>
+            </a:schemeClr>
+          </a:lnRef>
+          <a:fillRef idx="1">
+            <a:schemeClr val="accent4"/>
+          </a:fillRef>
+          <a:effectRef idx="0">
+            <a:schemeClr val="accent4"/>
+          </a:effectRef>
+          <a:fontRef idx="minor">
+            <a:schemeClr val="lt1"/>
+          </a:fontRef>
+        </p:style>
+        <p:txBody>
+          <a:bodyPr rtlCol="0" anchor="ctr"/>
+          <a:lstStyle/>
+          <a:p>
+            <a:pPr algn="ctr"/>
+            <a:r>
+              <a:rPr lang="en-US" dirty="0" smtClean="0"/>
+              <a:t>By creating a base template page, all other pages now refer to this  base.html page. Making other pages quite clean.  Everything that is not marked as blocks is inherited from the parent</a:t>
+            </a:r>
+            <a:endParaRPr lang="en-US" dirty="0"/>
+          </a:p>
+        </p:txBody>
+      </p:sp>
+      <p:pic>
+        <p:nvPicPr>
+          <p:cNvPr id="5" name="Picture 4"/>
+          <p:cNvPicPr>
+            <a:picLocks noChangeAspect="1"/>
+          </p:cNvPicPr>
+          <p:nvPr/>
+        </p:nvPicPr>
+        <p:blipFill>
+          <a:blip r:embed="rId3"/>
+          <a:stretch>
+            <a:fillRect/>
+          </a:stretch>
+        </p:blipFill>
+        <p:spPr>
+          <a:xfrm>
+            <a:off x="4514070" y="1095607"/>
+            <a:ext cx="5410669" cy="922100"/>
+          </a:xfrm>
+          <a:prstGeom prst="rect">
+            <a:avLst/>
+          </a:prstGeom>
+        </p:spPr>
+      </p:pic>
+      <p:sp>
+        <p:nvSpPr>
+          <p:cNvPr id="6" name="Left Arrow 5"/>
+          <p:cNvSpPr/>
+          <p:nvPr/>
+        </p:nvSpPr>
+        <p:spPr>
+          <a:xfrm>
+            <a:off x="2238103" y="1419497"/>
+            <a:ext cx="2429691" cy="226423"/>
+          </a:xfrm>
+          <a:prstGeom prst="leftArrow">
+            <a:avLst/>
+          </a:prstGeom>
+        </p:spPr>
+        <p:style>
+          <a:lnRef idx="2">
+            <a:schemeClr val="accent4">
+              <a:shade val="50000"/>
+            </a:schemeClr>
+          </a:lnRef>
+          <a:fillRef idx="1">
+            <a:schemeClr val="accent4"/>
+          </a:fillRef>
+          <a:effectRef idx="0">
+            <a:schemeClr val="accent4"/>
+          </a:effectRef>
+          <a:fontRef idx="minor">
+            <a:schemeClr val="lt1"/>
+          </a:fontRef>
+        </p:style>
+        <p:txBody>
+          <a:bodyPr rtlCol="0" anchor="ctr"/>
+          <a:lstStyle/>
+          <a:p>
+            <a:pPr algn="ctr"/>
+            <a:endParaRPr lang="en-US"/>
+          </a:p>
+        </p:txBody>
+      </p:sp>
+      <p:sp>
+        <p:nvSpPr>
+          <p:cNvPr id="7" name="TextBox 6"/>
+          <p:cNvSpPr txBox="1"/>
+          <p:nvPr/>
+        </p:nvSpPr>
+        <p:spPr>
+          <a:xfrm>
+            <a:off x="10032274" y="165464"/>
+            <a:ext cx="2072639" cy="2862322"/>
+          </a:xfrm>
+          <a:prstGeom prst="rect">
+            <a:avLst/>
+          </a:prstGeom>
+          <a:noFill/>
+        </p:spPr>
+        <p:txBody>
+          <a:bodyPr wrap="square" rtlCol="0">
+            <a:spAutoFit/>
+          </a:bodyPr>
+          <a:lstStyle/>
+          <a:p>
+            <a:r>
+              <a:rPr lang="en-US" dirty="0" smtClean="0"/>
+              <a:t>The block </a:t>
+            </a:r>
+            <a:r>
+              <a:rPr lang="en-US" i="1" dirty="0" smtClean="0"/>
+              <a:t>title in</a:t>
+            </a:r>
+            <a:r>
+              <a:rPr lang="en-US" dirty="0" smtClean="0"/>
+              <a:t> the base template will be replaced by </a:t>
+            </a:r>
+            <a:r>
+              <a:rPr lang="en-US" dirty="0" err="1" smtClean="0"/>
+              <a:t>jinja</a:t>
+            </a:r>
+            <a:r>
+              <a:rPr lang="en-US" dirty="0" smtClean="0"/>
+              <a:t> to the one in index.html </a:t>
+            </a:r>
+            <a:r>
+              <a:rPr lang="en-US" i="1" dirty="0" smtClean="0"/>
+              <a:t>i.e. Thermos – Welcome. </a:t>
+            </a:r>
+            <a:r>
+              <a:rPr lang="en-US" dirty="0" smtClean="0"/>
+              <a:t>Everything else will be copied/inherited from the base</a:t>
+            </a:r>
+            <a:endParaRPr lang="en-US" dirty="0"/>
+          </a:p>
+        </p:txBody>
+      </p:sp>
+    </p:spTree>
+    <p:extLst>
+      <p:ext uri="{BB962C8B-B14F-4D97-AF65-F5344CB8AC3E}">
+        <p14:creationId xmlns:p14="http://schemas.microsoft.com/office/powerpoint/2010/main" val="2318381840"/>
+      </p:ext>
+    </p:extLst>
+  </p:cSld>
+  <p:clrMapOvr>
+    <a:masterClrMapping/>
+  </p:clrMapOvr>
+  <p:timing>
+    <p:tnLst>
+      <p:par>
+        <p:cTn id="1" dur="indefinite" restart="never" nodeType="tmRoot"/>
+      </p:par>
+    </p:tnLst>
+  </p:timing>
+</p:sld>
+</file>
+
+<file path=ppt/slides/slide12.xml><?xml version="1.0" encoding="utf-8"?>
+<p:sld xmlns:a="http://schemas.openxmlformats.org/drawingml/2006/main" xmlns:r="http://schemas.openxmlformats.org/officeDocument/2006/relationships" xmlns:p="http://schemas.openxmlformats.org/presentationml/2006/main">
+  <p:cSld>
+    <p:spTree>
+      <p:nvGrpSpPr>
+        <p:cNvPr id="1" name=""/>
+        <p:cNvGrpSpPr/>
+        <p:nvPr/>
+      </p:nvGrpSpPr>
+      <p:grpSpPr>
+        <a:xfrm>
+          <a:off x="0" y="0"/>
+          <a:ext cx="0" cy="0"/>
+          <a:chOff x="0" y="0"/>
+          <a:chExt cx="0" cy="0"/>
+        </a:xfrm>
+      </p:grpSpPr>
+      <p:pic>
+        <p:nvPicPr>
+          <p:cNvPr id="3" name="Picture 2"/>
+          <p:cNvPicPr>
+            <a:picLocks noChangeAspect="1"/>
+          </p:cNvPicPr>
+          <p:nvPr/>
+        </p:nvPicPr>
+        <p:blipFill>
+          <a:blip r:embed="rId2"/>
+          <a:stretch>
+            <a:fillRect/>
+          </a:stretch>
+        </p:blipFill>
+        <p:spPr>
+          <a:xfrm>
+            <a:off x="969540" y="673059"/>
+            <a:ext cx="8702794" cy="5128704"/>
+          </a:xfrm>
+          <a:prstGeom prst="rect">
+            <a:avLst/>
+          </a:prstGeom>
+        </p:spPr>
+      </p:pic>
+    </p:spTree>
+    <p:extLst>
+      <p:ext uri="{BB962C8B-B14F-4D97-AF65-F5344CB8AC3E}">
+        <p14:creationId xmlns:p14="http://schemas.microsoft.com/office/powerpoint/2010/main" val="3618095838"/>
+      </p:ext>
+    </p:extLst>
+  </p:cSld>
+  <p:clrMapOvr>
+    <a:masterClrMapping/>
+  </p:clrMapOvr>
+  <p:timing>
+    <p:tnLst>
+      <p:par>
+        <p:cTn id="1" dur="indefinite" restart="never" nodeType="tmRoot"/>
+      </p:par>
+    </p:tnLst>
+  </p:timing>
+</p:sld>
+</file>
+
+<file path=ppt/slides/slide13.xml><?xml version="1.0" encoding="utf-8"?>
+<p:sld xmlns:a="http://schemas.openxmlformats.org/drawingml/2006/main" xmlns:r="http://schemas.openxmlformats.org/officeDocument/2006/relationships" xmlns:p="http://schemas.openxmlformats.org/presentationml/2006/main">
+  <p:cSld>
+    <p:spTree>
+      <p:nvGrpSpPr>
+        <p:cNvPr id="1" name=""/>
+        <p:cNvGrpSpPr/>
+        <p:nvPr/>
+      </p:nvGrpSpPr>
+      <p:grpSpPr>
+        <a:xfrm>
+          <a:off x="0" y="0"/>
+          <a:ext cx="0" cy="0"/>
+          <a:chOff x="0" y="0"/>
+          <a:chExt cx="0" cy="0"/>
+        </a:xfrm>
+      </p:grpSpPr>
+      <p:pic>
+        <p:nvPicPr>
+          <p:cNvPr id="2" name="Picture 1"/>
+          <p:cNvPicPr>
+            <a:picLocks noChangeAspect="1"/>
+          </p:cNvPicPr>
+          <p:nvPr/>
+        </p:nvPicPr>
+        <p:blipFill>
+          <a:blip r:embed="rId2"/>
+          <a:stretch>
+            <a:fillRect/>
+          </a:stretch>
+        </p:blipFill>
+        <p:spPr>
+          <a:xfrm>
+            <a:off x="701235" y="1945301"/>
+            <a:ext cx="8055038" cy="701101"/>
+          </a:xfrm>
+          <a:prstGeom prst="rect">
+            <a:avLst/>
+          </a:prstGeom>
+        </p:spPr>
+      </p:pic>
+      <p:sp>
+        <p:nvSpPr>
+          <p:cNvPr id="3" name="TextBox 2"/>
+          <p:cNvSpPr txBox="1"/>
+          <p:nvPr/>
+        </p:nvSpPr>
+        <p:spPr>
+          <a:xfrm>
+            <a:off x="8969829" y="888274"/>
+            <a:ext cx="2525485" cy="2585323"/>
+          </a:xfrm>
+          <a:prstGeom prst="rect">
+            <a:avLst/>
+          </a:prstGeom>
+        </p:spPr>
+        <p:style>
+          <a:lnRef idx="2">
+            <a:schemeClr val="dk1"/>
+          </a:lnRef>
+          <a:fillRef idx="1">
+            <a:schemeClr val="lt1"/>
+          </a:fillRef>
+          <a:effectRef idx="0">
+            <a:schemeClr val="dk1"/>
+          </a:effectRef>
+          <a:fontRef idx="minor">
+            <a:schemeClr val="dk1"/>
+          </a:fontRef>
+        </p:style>
+        <p:txBody>
+          <a:bodyPr wrap="square" rtlCol="0">
+            <a:spAutoFit/>
+          </a:bodyPr>
+          <a:lstStyle/>
+          <a:p>
+            <a:r>
+              <a:rPr lang="en-US" i="1" dirty="0" err="1" smtClean="0"/>
+              <a:t>url_for</a:t>
+            </a:r>
+            <a:r>
+              <a:rPr lang="en-US" dirty="0" smtClean="0"/>
+              <a:t> can also be used to replace fixed links of static links in the html, so that if the app is to be deployed to the web or any other source, links can easily be changed from python = </a:t>
+            </a:r>
+            <a:r>
+              <a:rPr lang="en-US" dirty="0" err="1" smtClean="0"/>
+              <a:t>aintainable</a:t>
+            </a:r>
+            <a:endParaRPr lang="en-US" dirty="0"/>
+          </a:p>
+        </p:txBody>
+      </p:sp>
+      <p:pic>
+        <p:nvPicPr>
+          <p:cNvPr id="4" name="Picture 3"/>
+          <p:cNvPicPr>
+            <a:picLocks noChangeAspect="1"/>
+          </p:cNvPicPr>
+          <p:nvPr/>
+        </p:nvPicPr>
+        <p:blipFill>
+          <a:blip r:embed="rId3"/>
+          <a:stretch>
+            <a:fillRect/>
+          </a:stretch>
+        </p:blipFill>
+        <p:spPr>
+          <a:xfrm>
+            <a:off x="701235" y="438664"/>
+            <a:ext cx="6919560" cy="685859"/>
+          </a:xfrm>
+          <a:prstGeom prst="rect">
+            <a:avLst/>
+          </a:prstGeom>
+        </p:spPr>
+      </p:pic>
+      <p:sp>
+        <p:nvSpPr>
+          <p:cNvPr id="7" name="Down Arrow 6"/>
+          <p:cNvSpPr/>
+          <p:nvPr/>
+        </p:nvSpPr>
+        <p:spPr>
+          <a:xfrm>
+            <a:off x="3622766" y="1227909"/>
+            <a:ext cx="348343" cy="676027"/>
+          </a:xfrm>
+          <a:prstGeom prst="downArrow">
+            <a:avLst/>
+          </a:prstGeom>
+        </p:spPr>
+        <p:style>
+          <a:lnRef idx="2">
+            <a:schemeClr val="accent1">
+              <a:shade val="50000"/>
+            </a:schemeClr>
+          </a:lnRef>
+          <a:fillRef idx="1">
+            <a:schemeClr val="accent1"/>
+          </a:fillRef>
+          <a:effectRef idx="0">
+            <a:schemeClr val="accent1"/>
+          </a:effectRef>
+          <a:fontRef idx="minor">
+            <a:schemeClr val="lt1"/>
+          </a:fontRef>
+        </p:style>
+        <p:txBody>
+          <a:bodyPr rtlCol="0" anchor="ctr"/>
+          <a:lstStyle/>
+          <a:p>
+            <a:pPr algn="ctr"/>
+            <a:endParaRPr lang="en-US"/>
+          </a:p>
+        </p:txBody>
+      </p:sp>
+      <p:cxnSp>
+        <p:nvCxnSpPr>
+          <p:cNvPr id="10" name="Straight Arrow Connector 9"/>
+          <p:cNvCxnSpPr/>
+          <p:nvPr/>
+        </p:nvCxnSpPr>
+        <p:spPr>
+          <a:xfrm flipH="1">
+            <a:off x="3796937" y="2177143"/>
+            <a:ext cx="748937" cy="1193074"/>
+          </a:xfrm>
+          <a:prstGeom prst="straightConnector1">
+            <a:avLst/>
+          </a:prstGeom>
+          <a:ln>
+            <a:tailEnd type="triangle"/>
+          </a:ln>
+        </p:spPr>
+        <p:style>
+          <a:lnRef idx="1">
+            <a:schemeClr val="accent1"/>
+          </a:lnRef>
+          <a:fillRef idx="0">
+            <a:schemeClr val="accent1"/>
+          </a:fillRef>
+          <a:effectRef idx="0">
+            <a:schemeClr val="accent1"/>
+          </a:effectRef>
+          <a:fontRef idx="minor">
+            <a:schemeClr val="tx1"/>
+          </a:fontRef>
+        </p:style>
+      </p:cxnSp>
+      <p:cxnSp>
+        <p:nvCxnSpPr>
+          <p:cNvPr id="12" name="Straight Arrow Connector 11"/>
+          <p:cNvCxnSpPr/>
+          <p:nvPr/>
+        </p:nvCxnSpPr>
+        <p:spPr>
+          <a:xfrm flipH="1">
+            <a:off x="5181600" y="2220686"/>
+            <a:ext cx="714103" cy="1246494"/>
+          </a:xfrm>
+          <a:prstGeom prst="straightConnector1">
+            <a:avLst/>
+          </a:prstGeom>
+          <a:ln>
+            <a:tailEnd type="triangle"/>
+          </a:ln>
+        </p:spPr>
+        <p:style>
+          <a:lnRef idx="1">
+            <a:schemeClr val="accent1"/>
+          </a:lnRef>
+          <a:fillRef idx="0">
+            <a:schemeClr val="accent1"/>
+          </a:fillRef>
+          <a:effectRef idx="0">
+            <a:schemeClr val="accent1"/>
+          </a:effectRef>
+          <a:fontRef idx="minor">
+            <a:schemeClr val="tx1"/>
+          </a:fontRef>
+        </p:style>
+      </p:cxnSp>
+      <p:sp>
+        <p:nvSpPr>
+          <p:cNvPr id="13" name="TextBox 12"/>
+          <p:cNvSpPr txBox="1"/>
+          <p:nvPr/>
+        </p:nvSpPr>
+        <p:spPr>
+          <a:xfrm>
+            <a:off x="3257005" y="3300549"/>
+            <a:ext cx="1210491" cy="369332"/>
+          </a:xfrm>
+          <a:prstGeom prst="rect">
+            <a:avLst/>
+          </a:prstGeom>
+          <a:noFill/>
+        </p:spPr>
+        <p:txBody>
+          <a:bodyPr wrap="square" rtlCol="0">
+            <a:spAutoFit/>
+          </a:bodyPr>
+          <a:lstStyle/>
+          <a:p>
+            <a:r>
+              <a:rPr lang="en-US" dirty="0" smtClean="0"/>
+              <a:t>endpoint</a:t>
+            </a:r>
+            <a:endParaRPr lang="en-US" dirty="0"/>
+          </a:p>
+        </p:txBody>
+      </p:sp>
+      <p:sp>
+        <p:nvSpPr>
+          <p:cNvPr id="14" name="TextBox 13"/>
+          <p:cNvSpPr txBox="1"/>
+          <p:nvPr/>
+        </p:nvSpPr>
+        <p:spPr>
+          <a:xfrm>
+            <a:off x="4972594" y="3467180"/>
+            <a:ext cx="2569028" cy="923330"/>
+          </a:xfrm>
+          <a:prstGeom prst="rect">
+            <a:avLst/>
+          </a:prstGeom>
+          <a:noFill/>
+        </p:spPr>
+        <p:txBody>
+          <a:bodyPr wrap="square" rtlCol="0">
+            <a:spAutoFit/>
+          </a:bodyPr>
+          <a:lstStyle/>
+          <a:p>
+            <a:r>
+              <a:rPr lang="en-US" dirty="0" smtClean="0"/>
+              <a:t>Any keyword argument that can be passed to the view function</a:t>
+            </a:r>
+            <a:endParaRPr lang="en-US" dirty="0"/>
+          </a:p>
+        </p:txBody>
+      </p:sp>
+    </p:spTree>
+    <p:extLst>
+      <p:ext uri="{BB962C8B-B14F-4D97-AF65-F5344CB8AC3E}">
+        <p14:creationId xmlns:p14="http://schemas.microsoft.com/office/powerpoint/2010/main" val="2283290412"/>
+      </p:ext>
+    </p:extLst>
+  </p:cSld>
+  <p:clrMapOvr>
+    <a:masterClrMapping/>
+  </p:clrMapOvr>
+  <p:timing>
+    <p:tnLst>
+      <p:par>
+        <p:cTn id="1" dur="indefinite" restart="never" nodeType="tmRoot"/>
+      </p:par>
+    </p:tnLst>
+  </p:timing>
+</p:sld>
+</file>
+
+<file path=ppt/slides/slide14.xml><?xml version="1.0" encoding="utf-8"?>
+<p:sld xmlns:a="http://schemas.openxmlformats.org/drawingml/2006/main" xmlns:r="http://schemas.openxmlformats.org/officeDocument/2006/relationships" xmlns:p="http://schemas.openxmlformats.org/presentationml/2006/main">
+  <p:cSld>
+    <p:spTree>
+      <p:nvGrpSpPr>
+        <p:cNvPr id="1" name=""/>
+        <p:cNvGrpSpPr/>
+        <p:nvPr/>
+      </p:nvGrpSpPr>
+      <p:grpSpPr>
+        <a:xfrm>
+          <a:off x="0" y="0"/>
+          <a:ext cx="0" cy="0"/>
+          <a:chOff x="0" y="0"/>
+          <a:chExt cx="0" cy="0"/>
+        </a:xfrm>
+      </p:grpSpPr>
+      <p:pic>
+        <p:nvPicPr>
+          <p:cNvPr id="2" name="Picture 1"/>
+          <p:cNvPicPr>
+            <a:picLocks noChangeAspect="1"/>
+          </p:cNvPicPr>
+          <p:nvPr/>
+        </p:nvPicPr>
+        <p:blipFill>
+          <a:blip r:embed="rId2"/>
+          <a:stretch>
+            <a:fillRect/>
+          </a:stretch>
+        </p:blipFill>
+        <p:spPr>
+          <a:xfrm>
+            <a:off x="1437627" y="488513"/>
+            <a:ext cx="8672312" cy="5898391"/>
+          </a:xfrm>
+          <a:prstGeom prst="rect">
+            <a:avLst/>
+          </a:prstGeom>
+        </p:spPr>
+      </p:pic>
+    </p:spTree>
+    <p:extLst>
+      <p:ext uri="{BB962C8B-B14F-4D97-AF65-F5344CB8AC3E}">
+        <p14:creationId xmlns:p14="http://schemas.microsoft.com/office/powerpoint/2010/main" val="1278618050"/>
+      </p:ext>
+    </p:extLst>
+  </p:cSld>
+  <p:clrMapOvr>
+    <a:masterClrMapping/>
+  </p:clrMapOvr>
+  <p:timing>
+    <p:tnLst>
+      <p:par>
+        <p:cTn id="1" dur="indefinite" restart="never" nodeType="tmRoot"/>
+      </p:par>
+    </p:tnLst>
+  </p:timing>
+</p:sld>
+</file>
+
+<file path=ppt/slides/slide15.xml><?xml version="1.0" encoding="utf-8"?>
+<p:sld xmlns:a="http://schemas.openxmlformats.org/drawingml/2006/main" xmlns:r="http://schemas.openxmlformats.org/officeDocument/2006/relationships" xmlns:p="http://schemas.openxmlformats.org/presentationml/2006/main">
+  <p:cSld>
+    <p:spTree>
+      <p:nvGrpSpPr>
+        <p:cNvPr id="1" name=""/>
+        <p:cNvGrpSpPr/>
+        <p:nvPr/>
+      </p:nvGrpSpPr>
+      <p:grpSpPr>
+        <a:xfrm>
+          <a:off x="0" y="0"/>
+          <a:ext cx="0" cy="0"/>
+          <a:chOff x="0" y="0"/>
+          <a:chExt cx="0" cy="0"/>
+        </a:xfrm>
+      </p:grpSpPr>
+      <p:pic>
+        <p:nvPicPr>
+          <p:cNvPr id="2" name="Picture 1"/>
+          <p:cNvPicPr>
+            <a:picLocks noChangeAspect="1"/>
+          </p:cNvPicPr>
+          <p:nvPr/>
+        </p:nvPicPr>
+        <p:blipFill>
+          <a:blip r:embed="rId2"/>
+          <a:stretch>
+            <a:fillRect/>
+          </a:stretch>
+        </p:blipFill>
+        <p:spPr>
+          <a:xfrm>
+            <a:off x="1843671" y="601735"/>
+            <a:ext cx="8504657" cy="5654530"/>
+          </a:xfrm>
+          <a:prstGeom prst="rect">
+            <a:avLst/>
+          </a:prstGeom>
+        </p:spPr>
+      </p:pic>
+    </p:spTree>
+    <p:extLst>
+      <p:ext uri="{BB962C8B-B14F-4D97-AF65-F5344CB8AC3E}">
+        <p14:creationId xmlns:p14="http://schemas.microsoft.com/office/powerpoint/2010/main" val="816221801"/>
+      </p:ext>
+    </p:extLst>
+  </p:cSld>
+  <p:clrMapOvr>
+    <a:masterClrMapping/>
+  </p:clrMapOvr>
+  <p:timing>
+    <p:tnLst>
+      <p:par>
+        <p:cTn id="1" dur="indefinite" restart="never" nodeType="tmRoot"/>
+      </p:par>
+    </p:tnLst>
+  </p:timing>
+</p:sld>
+</file>
+
 <file path=ppt/slides/slide2.xml><?xml version="1.0" encoding="utf-8"?>
 <p:sld xmlns:a="http://schemas.openxmlformats.org/drawingml/2006/main" xmlns:r="http://schemas.openxmlformats.org/officeDocument/2006/relationships" xmlns:p="http://schemas.openxmlformats.org/presentationml/2006/main">
   <p:cSld>
@@ -3835,7 +4722,7 @@
         </p:blipFill>
         <p:spPr>
           <a:xfrm>
-            <a:off x="809654" y="533244"/>
+            <a:off x="1976602" y="2187872"/>
             <a:ext cx="5608806" cy="3596952"/>
           </a:xfrm>
           <a:prstGeom prst="rect">
@@ -3843,6 +4730,33 @@
           </a:prstGeom>
         </p:spPr>
       </p:pic>
+      <p:sp>
+        <p:nvSpPr>
+          <p:cNvPr id="3" name="Title 2"/>
+          <p:cNvSpPr>
+            <a:spLocks noGrp="1"/>
+          </p:cNvSpPr>
+          <p:nvPr>
+            <p:ph type="title"/>
+          </p:nvPr>
+        </p:nvSpPr>
+        <p:spPr/>
+        <p:txBody>
+          <a:bodyPr/>
+          <a:lstStyle/>
+          <a:p>
+            <a:r>
+              <a:rPr lang="en-US" dirty="0" err="1" smtClean="0"/>
+              <a:t>Jinja</a:t>
+            </a:r>
+            <a:r>
+              <a:rPr lang="en-US" dirty="0" smtClean="0"/>
+              <a:t> stuff</a:t>
+            </a:r>
+            <a:endParaRPr lang="en-US" dirty="0"/>
+          </a:p>
+        </p:txBody>
+      </p:sp>
     </p:spTree>
     <p:extLst>
       <p:ext uri="{BB962C8B-B14F-4D97-AF65-F5344CB8AC3E}">
@@ -3962,6 +4876,36 @@
           </a:p>
         </p:txBody>
       </p:sp>
+      <p:sp>
+        <p:nvSpPr>
+          <p:cNvPr id="3" name="TextBox 2"/>
+          <p:cNvSpPr txBox="1"/>
+          <p:nvPr/>
+        </p:nvSpPr>
+        <p:spPr>
+          <a:xfrm>
+            <a:off x="7262949" y="3091543"/>
+            <a:ext cx="4432662" cy="923330"/>
+          </a:xfrm>
+          <a:prstGeom prst="rect">
+            <a:avLst/>
+          </a:prstGeom>
+          <a:noFill/>
+        </p:spPr>
+        <p:txBody>
+          <a:bodyPr wrap="square" rtlCol="0">
+            <a:spAutoFit/>
+          </a:bodyPr>
+          <a:lstStyle/>
+          <a:p>
+            <a:r>
+              <a:rPr lang="en-US" dirty="0" smtClean="0"/>
+              <a:t>{{ }} double curly braces are used when we want to output the value from a variable or function to the HTML page</a:t>
+            </a:r>
+            <a:endParaRPr lang="en-US" dirty="0"/>
+          </a:p>
+        </p:txBody>
+      </p:sp>
     </p:spTree>
     <p:extLst>
       <p:ext uri="{BB962C8B-B14F-4D97-AF65-F5344CB8AC3E}">
@@ -3972,6 +4916,13 @@
   <p:clrMapOvr>
     <a:masterClrMapping/>
   </p:clrMapOvr>
+  <p:timing>
+    <p:tnLst>
+      <p:par>
+        <p:cTn id="1" dur="indefinite" restart="never" nodeType="tmRoot"/>
+      </p:par>
+    </p:tnLst>
+  </p:timing>
 </p:sld>
 </file>
 

</xml_diff>